<commit_message>
Spec for next version
</commit_message>
<xml_diff>
--- a/Doc/images.pptx
+++ b/Doc/images.pptx
@@ -7,6 +7,7 @@
   <p:sldIdLst>
     <p:sldId id="256" r:id="rId2"/>
     <p:sldId id="257" r:id="rId3"/>
+    <p:sldId id="258" r:id="rId4"/>
   </p:sldIdLst>
   <p:sldSz cx="12192000" cy="6858000"/>
   <p:notesSz cx="6858000" cy="9144000"/>
@@ -105,6 +106,11 @@
       </a:defRPr>
     </a:lvl9pPr>
   </p:defaultTextStyle>
+  <p:extLst>
+    <p:ext uri="{EFAFB233-063F-42B5-8137-9DF3F51BA10A}">
+      <p15:sldGuideLst xmlns:p15="http://schemas.microsoft.com/office/powerpoint/2012/main"/>
+    </p:ext>
+  </p:extLst>
 </p:presentation>
 </file>
 
@@ -257,7 +263,7 @@
           <a:p>
             <a:fld id="{F2B3E486-B0F0-4ABA-8003-FB608F9B4972}" type="datetimeFigureOut">
               <a:rPr lang="en-US" smtClean="0"/>
-              <a:t>5/10/2024</a:t>
+              <a:t>6/2/2024</a:t>
             </a:fld>
             <a:endParaRPr lang="en-US"/>
           </a:p>
@@ -457,7 +463,7 @@
           <a:p>
             <a:fld id="{F2B3E486-B0F0-4ABA-8003-FB608F9B4972}" type="datetimeFigureOut">
               <a:rPr lang="en-US" smtClean="0"/>
-              <a:t>5/10/2024</a:t>
+              <a:t>6/2/2024</a:t>
             </a:fld>
             <a:endParaRPr lang="en-US"/>
           </a:p>
@@ -667,7 +673,7 @@
           <a:p>
             <a:fld id="{F2B3E486-B0F0-4ABA-8003-FB608F9B4972}" type="datetimeFigureOut">
               <a:rPr lang="en-US" smtClean="0"/>
-              <a:t>5/10/2024</a:t>
+              <a:t>6/2/2024</a:t>
             </a:fld>
             <a:endParaRPr lang="en-US"/>
           </a:p>
@@ -867,7 +873,7 @@
           <a:p>
             <a:fld id="{F2B3E486-B0F0-4ABA-8003-FB608F9B4972}" type="datetimeFigureOut">
               <a:rPr lang="en-US" smtClean="0"/>
-              <a:t>5/10/2024</a:t>
+              <a:t>6/2/2024</a:t>
             </a:fld>
             <a:endParaRPr lang="en-US"/>
           </a:p>
@@ -1143,7 +1149,7 @@
           <a:p>
             <a:fld id="{F2B3E486-B0F0-4ABA-8003-FB608F9B4972}" type="datetimeFigureOut">
               <a:rPr lang="en-US" smtClean="0"/>
-              <a:t>5/10/2024</a:t>
+              <a:t>6/2/2024</a:t>
             </a:fld>
             <a:endParaRPr lang="en-US"/>
           </a:p>
@@ -1411,7 +1417,7 @@
           <a:p>
             <a:fld id="{F2B3E486-B0F0-4ABA-8003-FB608F9B4972}" type="datetimeFigureOut">
               <a:rPr lang="en-US" smtClean="0"/>
-              <a:t>5/10/2024</a:t>
+              <a:t>6/2/2024</a:t>
             </a:fld>
             <a:endParaRPr lang="en-US"/>
           </a:p>
@@ -1826,7 +1832,7 @@
           <a:p>
             <a:fld id="{F2B3E486-B0F0-4ABA-8003-FB608F9B4972}" type="datetimeFigureOut">
               <a:rPr lang="en-US" smtClean="0"/>
-              <a:t>5/10/2024</a:t>
+              <a:t>6/2/2024</a:t>
             </a:fld>
             <a:endParaRPr lang="en-US"/>
           </a:p>
@@ -1968,7 +1974,7 @@
           <a:p>
             <a:fld id="{F2B3E486-B0F0-4ABA-8003-FB608F9B4972}" type="datetimeFigureOut">
               <a:rPr lang="en-US" smtClean="0"/>
-              <a:t>5/10/2024</a:t>
+              <a:t>6/2/2024</a:t>
             </a:fld>
             <a:endParaRPr lang="en-US"/>
           </a:p>
@@ -2081,7 +2087,7 @@
           <a:p>
             <a:fld id="{F2B3E486-B0F0-4ABA-8003-FB608F9B4972}" type="datetimeFigureOut">
               <a:rPr lang="en-US" smtClean="0"/>
-              <a:t>5/10/2024</a:t>
+              <a:t>6/2/2024</a:t>
             </a:fld>
             <a:endParaRPr lang="en-US"/>
           </a:p>
@@ -2394,7 +2400,7 @@
           <a:p>
             <a:fld id="{F2B3E486-B0F0-4ABA-8003-FB608F9B4972}" type="datetimeFigureOut">
               <a:rPr lang="en-US" smtClean="0"/>
-              <a:t>5/10/2024</a:t>
+              <a:t>6/2/2024</a:t>
             </a:fld>
             <a:endParaRPr lang="en-US"/>
           </a:p>
@@ -2683,7 +2689,7 @@
           <a:p>
             <a:fld id="{F2B3E486-B0F0-4ABA-8003-FB608F9B4972}" type="datetimeFigureOut">
               <a:rPr lang="en-US" smtClean="0"/>
-              <a:t>5/10/2024</a:t>
+              <a:t>6/2/2024</a:t>
             </a:fld>
             <a:endParaRPr lang="en-US"/>
           </a:p>
@@ -2926,7 +2932,7 @@
           <a:p>
             <a:fld id="{F2B3E486-B0F0-4ABA-8003-FB608F9B4972}" type="datetimeFigureOut">
               <a:rPr lang="en-US" smtClean="0"/>
-              <a:t>5/10/2024</a:t>
+              <a:t>6/2/2024</a:t>
             </a:fld>
             <a:endParaRPr lang="en-US"/>
           </a:p>
@@ -4437,6 +4443,797 @@
 </p:sld>
 </file>
 
+<file path=ppt/slides/slide3.xml><?xml version="1.0" encoding="utf-8"?>
+<p:sld xmlns:a="http://schemas.openxmlformats.org/drawingml/2006/main" xmlns:r="http://schemas.openxmlformats.org/officeDocument/2006/relationships" xmlns:p="http://schemas.openxmlformats.org/presentationml/2006/main">
+  <p:cSld>
+    <p:spTree>
+      <p:nvGrpSpPr>
+        <p:cNvPr id="1" name=""/>
+        <p:cNvGrpSpPr/>
+        <p:nvPr/>
+      </p:nvGrpSpPr>
+      <p:grpSpPr>
+        <a:xfrm>
+          <a:off x="0" y="0"/>
+          <a:ext cx="0" cy="0"/>
+          <a:chOff x="0" y="0"/>
+          <a:chExt cx="0" cy="0"/>
+        </a:xfrm>
+      </p:grpSpPr>
+      <p:sp>
+        <p:nvSpPr>
+          <p:cNvPr id="4" name="Rectangle 3">
+            <a:extLst>
+              <a:ext uri="{FF2B5EF4-FFF2-40B4-BE49-F238E27FC236}">
+                <a16:creationId xmlns:a16="http://schemas.microsoft.com/office/drawing/2014/main" id="{D08506F2-DEA8-8E64-5DFD-504CDEAF19A4}"/>
+              </a:ext>
+            </a:extLst>
+          </p:cNvPr>
+          <p:cNvSpPr/>
+          <p:nvPr/>
+        </p:nvSpPr>
+        <p:spPr>
+          <a:xfrm>
+            <a:off x="2482850" y="1663700"/>
+            <a:ext cx="4019550" cy="3533140"/>
+          </a:xfrm>
+          <a:prstGeom prst="rect">
+            <a:avLst/>
+          </a:prstGeom>
+          <a:solidFill>
+            <a:schemeClr val="bg1">
+              <a:lumMod val="95000"/>
+            </a:schemeClr>
+          </a:solidFill>
+          <a:ln w="6350">
+            <a:solidFill>
+              <a:schemeClr val="bg1">
+                <a:lumMod val="65000"/>
+              </a:schemeClr>
+            </a:solidFill>
+          </a:ln>
+        </p:spPr>
+        <p:style>
+          <a:lnRef idx="2">
+            <a:schemeClr val="accent1">
+              <a:shade val="15000"/>
+            </a:schemeClr>
+          </a:lnRef>
+          <a:fillRef idx="1">
+            <a:schemeClr val="accent1"/>
+          </a:fillRef>
+          <a:effectRef idx="0">
+            <a:schemeClr val="accent1"/>
+          </a:effectRef>
+          <a:fontRef idx="minor">
+            <a:schemeClr val="lt1"/>
+          </a:fontRef>
+        </p:style>
+        <p:txBody>
+          <a:bodyPr rtlCol="0" anchor="ctr"/>
+          <a:lstStyle/>
+          <a:p>
+            <a:pPr algn="ctr"/>
+            <a:endParaRPr lang="en-US"/>
+          </a:p>
+        </p:txBody>
+      </p:sp>
+      <p:sp>
+        <p:nvSpPr>
+          <p:cNvPr id="5" name="Rectangle 4">
+            <a:extLst>
+              <a:ext uri="{FF2B5EF4-FFF2-40B4-BE49-F238E27FC236}">
+                <a16:creationId xmlns:a16="http://schemas.microsoft.com/office/drawing/2014/main" id="{0B65CF06-00F5-0D1E-E048-923BABC54EFD}"/>
+              </a:ext>
+            </a:extLst>
+          </p:cNvPr>
+          <p:cNvSpPr/>
+          <p:nvPr/>
+        </p:nvSpPr>
+        <p:spPr>
+          <a:xfrm>
+            <a:off x="4438650" y="2647950"/>
+            <a:ext cx="1911350" cy="1403350"/>
+          </a:xfrm>
+          <a:prstGeom prst="rect">
+            <a:avLst/>
+          </a:prstGeom>
+          <a:solidFill>
+            <a:schemeClr val="bg1"/>
+          </a:solidFill>
+          <a:ln w="6350">
+            <a:solidFill>
+              <a:schemeClr val="bg1">
+                <a:lumMod val="65000"/>
+              </a:schemeClr>
+            </a:solidFill>
+          </a:ln>
+        </p:spPr>
+        <p:style>
+          <a:lnRef idx="2">
+            <a:schemeClr val="accent1">
+              <a:shade val="15000"/>
+            </a:schemeClr>
+          </a:lnRef>
+          <a:fillRef idx="1">
+            <a:schemeClr val="accent1"/>
+          </a:fillRef>
+          <a:effectRef idx="0">
+            <a:schemeClr val="accent1"/>
+          </a:effectRef>
+          <a:fontRef idx="minor">
+            <a:schemeClr val="lt1"/>
+          </a:fontRef>
+        </p:style>
+        <p:txBody>
+          <a:bodyPr rtlCol="0" anchor="t"/>
+          <a:lstStyle/>
+          <a:p>
+            <a:r>
+              <a:rPr lang="en-US" sz="1100" dirty="0">
+                <a:solidFill>
+                  <a:schemeClr val="tx1"/>
+                </a:solidFill>
+                <a:latin typeface="Arial" panose="020B0604020202020204" pitchFamily="34" charset="0"/>
+                <a:cs typeface="Arial" panose="020B0604020202020204" pitchFamily="34" charset="0"/>
+              </a:rPr>
+              <a:t>Abcd.pdf</a:t>
+            </a:r>
+          </a:p>
+          <a:p>
+            <a:r>
+              <a:rPr lang="en-US" sz="1100" dirty="0">
+                <a:solidFill>
+                  <a:schemeClr val="tx1"/>
+                </a:solidFill>
+                <a:latin typeface="Arial" panose="020B0604020202020204" pitchFamily="34" charset="0"/>
+                <a:cs typeface="Arial" panose="020B0604020202020204" pitchFamily="34" charset="0"/>
+              </a:rPr>
+              <a:t>Efgh.pdf</a:t>
+            </a:r>
+          </a:p>
+          <a:p>
+            <a:r>
+              <a:rPr lang="en-US" sz="1100" dirty="0">
+                <a:solidFill>
+                  <a:schemeClr val="tx1"/>
+                </a:solidFill>
+                <a:latin typeface="Arial" panose="020B0604020202020204" pitchFamily="34" charset="0"/>
+                <a:cs typeface="Arial" panose="020B0604020202020204" pitchFamily="34" charset="0"/>
+              </a:rPr>
+              <a:t>Auva.pdf</a:t>
+            </a:r>
+          </a:p>
+          <a:p>
+            <a:r>
+              <a:rPr lang="en-US" sz="1100" dirty="0">
+                <a:solidFill>
+                  <a:schemeClr val="tx1"/>
+                </a:solidFill>
+                <a:latin typeface="Arial" panose="020B0604020202020204" pitchFamily="34" charset="0"/>
+                <a:cs typeface="Arial" panose="020B0604020202020204" pitchFamily="34" charset="0"/>
+              </a:rPr>
+              <a:t>Abcd.pdf</a:t>
+            </a:r>
+          </a:p>
+          <a:p>
+            <a:r>
+              <a:rPr lang="en-US" sz="1100" dirty="0">
+                <a:solidFill>
+                  <a:schemeClr val="tx1"/>
+                </a:solidFill>
+                <a:latin typeface="Arial" panose="020B0604020202020204" pitchFamily="34" charset="0"/>
+                <a:cs typeface="Arial" panose="020B0604020202020204" pitchFamily="34" charset="0"/>
+              </a:rPr>
+              <a:t>Efgh.pdf</a:t>
+            </a:r>
+          </a:p>
+          <a:p>
+            <a:r>
+              <a:rPr lang="en-US" sz="1100" dirty="0">
+                <a:solidFill>
+                  <a:schemeClr val="tx1"/>
+                </a:solidFill>
+                <a:latin typeface="Arial" panose="020B0604020202020204" pitchFamily="34" charset="0"/>
+                <a:cs typeface="Arial" panose="020B0604020202020204" pitchFamily="34" charset="0"/>
+              </a:rPr>
+              <a:t>Auva.pdf</a:t>
+            </a:r>
+          </a:p>
+          <a:p>
+            <a:r>
+              <a:rPr lang="en-US" sz="1100" dirty="0">
+                <a:solidFill>
+                  <a:schemeClr val="tx1"/>
+                </a:solidFill>
+                <a:latin typeface="Arial" panose="020B0604020202020204" pitchFamily="34" charset="0"/>
+                <a:cs typeface="Arial" panose="020B0604020202020204" pitchFamily="34" charset="0"/>
+              </a:rPr>
+              <a:t>Abcd.pdf</a:t>
+            </a:r>
+          </a:p>
+          <a:p>
+            <a:r>
+              <a:rPr lang="en-US" sz="1100" dirty="0">
+                <a:solidFill>
+                  <a:schemeClr val="tx1"/>
+                </a:solidFill>
+                <a:latin typeface="Arial" panose="020B0604020202020204" pitchFamily="34" charset="0"/>
+                <a:cs typeface="Arial" panose="020B0604020202020204" pitchFamily="34" charset="0"/>
+              </a:rPr>
+              <a:t>Efgh.pdf</a:t>
+            </a:r>
+          </a:p>
+          <a:p>
+            <a:endParaRPr lang="en-US" sz="1100" dirty="0">
+              <a:solidFill>
+                <a:schemeClr val="tx1"/>
+              </a:solidFill>
+              <a:latin typeface="Arial" panose="020B0604020202020204" pitchFamily="34" charset="0"/>
+              <a:cs typeface="Arial" panose="020B0604020202020204" pitchFamily="34" charset="0"/>
+            </a:endParaRPr>
+          </a:p>
+        </p:txBody>
+      </p:sp>
+      <p:sp>
+        <p:nvSpPr>
+          <p:cNvPr id="6" name="Rectangle 5">
+            <a:extLst>
+              <a:ext uri="{FF2B5EF4-FFF2-40B4-BE49-F238E27FC236}">
+                <a16:creationId xmlns:a16="http://schemas.microsoft.com/office/drawing/2014/main" id="{1E43F221-C5B1-A0C8-DEC5-C082EA7B55F8}"/>
+              </a:ext>
+            </a:extLst>
+          </p:cNvPr>
+          <p:cNvSpPr/>
+          <p:nvPr/>
+        </p:nvSpPr>
+        <p:spPr>
+          <a:xfrm>
+            <a:off x="6203156" y="2672557"/>
+            <a:ext cx="123031" cy="825500"/>
+          </a:xfrm>
+          <a:prstGeom prst="rect">
+            <a:avLst/>
+          </a:prstGeom>
+          <a:solidFill>
+            <a:schemeClr val="bg1">
+              <a:lumMod val="95000"/>
+            </a:schemeClr>
+          </a:solidFill>
+          <a:ln w="6350">
+            <a:solidFill>
+              <a:schemeClr val="bg1">
+                <a:lumMod val="65000"/>
+              </a:schemeClr>
+            </a:solidFill>
+          </a:ln>
+        </p:spPr>
+        <p:style>
+          <a:lnRef idx="2">
+            <a:schemeClr val="accent1">
+              <a:shade val="15000"/>
+            </a:schemeClr>
+          </a:lnRef>
+          <a:fillRef idx="1">
+            <a:schemeClr val="accent1"/>
+          </a:fillRef>
+          <a:effectRef idx="0">
+            <a:schemeClr val="accent1"/>
+          </a:effectRef>
+          <a:fontRef idx="minor">
+            <a:schemeClr val="lt1"/>
+          </a:fontRef>
+        </p:style>
+        <p:txBody>
+          <a:bodyPr rtlCol="0" anchor="ctr"/>
+          <a:lstStyle/>
+          <a:p>
+            <a:pPr algn="ctr"/>
+            <a:endParaRPr lang="en-US"/>
+          </a:p>
+        </p:txBody>
+      </p:sp>
+      <p:sp>
+        <p:nvSpPr>
+          <p:cNvPr id="7" name="Rectangle 6">
+            <a:extLst>
+              <a:ext uri="{FF2B5EF4-FFF2-40B4-BE49-F238E27FC236}">
+                <a16:creationId xmlns:a16="http://schemas.microsoft.com/office/drawing/2014/main" id="{D02A684E-0E17-F18E-75F8-2212BCC8DB42}"/>
+              </a:ext>
+            </a:extLst>
+          </p:cNvPr>
+          <p:cNvSpPr/>
+          <p:nvPr/>
+        </p:nvSpPr>
+        <p:spPr>
+          <a:xfrm>
+            <a:off x="6181724" y="2647950"/>
+            <a:ext cx="168275" cy="1403350"/>
+          </a:xfrm>
+          <a:prstGeom prst="rect">
+            <a:avLst/>
+          </a:prstGeom>
+          <a:noFill/>
+          <a:ln w="6350">
+            <a:solidFill>
+              <a:schemeClr val="bg1">
+                <a:lumMod val="65000"/>
+              </a:schemeClr>
+            </a:solidFill>
+          </a:ln>
+        </p:spPr>
+        <p:style>
+          <a:lnRef idx="2">
+            <a:schemeClr val="accent1">
+              <a:shade val="15000"/>
+            </a:schemeClr>
+          </a:lnRef>
+          <a:fillRef idx="1">
+            <a:schemeClr val="accent1"/>
+          </a:fillRef>
+          <a:effectRef idx="0">
+            <a:schemeClr val="accent1"/>
+          </a:effectRef>
+          <a:fontRef idx="minor">
+            <a:schemeClr val="lt1"/>
+          </a:fontRef>
+        </p:style>
+        <p:txBody>
+          <a:bodyPr rtlCol="0" anchor="t"/>
+          <a:lstStyle/>
+          <a:p>
+            <a:endParaRPr lang="en-US" sz="1100" dirty="0">
+              <a:solidFill>
+                <a:schemeClr val="tx1"/>
+              </a:solidFill>
+              <a:latin typeface="Arial" panose="020B0604020202020204" pitchFamily="34" charset="0"/>
+              <a:cs typeface="Arial" panose="020B0604020202020204" pitchFamily="34" charset="0"/>
+            </a:endParaRPr>
+          </a:p>
+        </p:txBody>
+      </p:sp>
+      <p:sp>
+        <p:nvSpPr>
+          <p:cNvPr id="8" name="Rectangle 7">
+            <a:extLst>
+              <a:ext uri="{FF2B5EF4-FFF2-40B4-BE49-F238E27FC236}">
+                <a16:creationId xmlns:a16="http://schemas.microsoft.com/office/drawing/2014/main" id="{1750A240-77D2-772E-2E38-7B516CA870CE}"/>
+              </a:ext>
+            </a:extLst>
+          </p:cNvPr>
+          <p:cNvSpPr/>
+          <p:nvPr/>
+        </p:nvSpPr>
+        <p:spPr>
+          <a:xfrm>
+            <a:off x="2581275" y="2316480"/>
+            <a:ext cx="3768724" cy="274320"/>
+          </a:xfrm>
+          <a:prstGeom prst="rect">
+            <a:avLst/>
+          </a:prstGeom>
+          <a:solidFill>
+            <a:schemeClr val="bg1"/>
+          </a:solidFill>
+          <a:ln w="6350">
+            <a:solidFill>
+              <a:schemeClr val="bg1">
+                <a:lumMod val="65000"/>
+              </a:schemeClr>
+            </a:solidFill>
+          </a:ln>
+        </p:spPr>
+        <p:style>
+          <a:lnRef idx="2">
+            <a:schemeClr val="accent1">
+              <a:shade val="15000"/>
+            </a:schemeClr>
+          </a:lnRef>
+          <a:fillRef idx="1">
+            <a:schemeClr val="accent1"/>
+          </a:fillRef>
+          <a:effectRef idx="0">
+            <a:schemeClr val="accent1"/>
+          </a:effectRef>
+          <a:fontRef idx="minor">
+            <a:schemeClr val="lt1"/>
+          </a:fontRef>
+        </p:style>
+        <p:txBody>
+          <a:bodyPr rtlCol="0" anchor="t"/>
+          <a:lstStyle/>
+          <a:p>
+            <a:r>
+              <a:rPr lang="en-US" sz="1100" dirty="0">
+                <a:solidFill>
+                  <a:schemeClr val="tx1"/>
+                </a:solidFill>
+                <a:latin typeface="Arial" panose="020B0604020202020204" pitchFamily="34" charset="0"/>
+                <a:cs typeface="Arial" panose="020B0604020202020204" pitchFamily="34" charset="0"/>
+              </a:rPr>
+              <a:t>Dossier </a:t>
+            </a:r>
+            <a:r>
+              <a:rPr lang="en-US" sz="1100" dirty="0" err="1">
+                <a:solidFill>
+                  <a:schemeClr val="tx1"/>
+                </a:solidFill>
+                <a:latin typeface="Arial" panose="020B0604020202020204" pitchFamily="34" charset="0"/>
+                <a:cs typeface="Arial" panose="020B0604020202020204" pitchFamily="34" charset="0"/>
+              </a:rPr>
+              <a:t>d’entrée</a:t>
+            </a:r>
+            <a:endParaRPr lang="en-US" sz="1100" dirty="0">
+              <a:solidFill>
+                <a:schemeClr val="tx1"/>
+              </a:solidFill>
+              <a:latin typeface="Arial" panose="020B0604020202020204" pitchFamily="34" charset="0"/>
+              <a:cs typeface="Arial" panose="020B0604020202020204" pitchFamily="34" charset="0"/>
+            </a:endParaRPr>
+          </a:p>
+        </p:txBody>
+      </p:sp>
+      <p:sp>
+        <p:nvSpPr>
+          <p:cNvPr id="9" name="Rectangle 8">
+            <a:extLst>
+              <a:ext uri="{FF2B5EF4-FFF2-40B4-BE49-F238E27FC236}">
+                <a16:creationId xmlns:a16="http://schemas.microsoft.com/office/drawing/2014/main" id="{5BCBB0C6-F2E8-D595-5104-277AF8E1E232}"/>
+              </a:ext>
+            </a:extLst>
+          </p:cNvPr>
+          <p:cNvSpPr/>
+          <p:nvPr/>
+        </p:nvSpPr>
+        <p:spPr>
+          <a:xfrm>
+            <a:off x="2651760" y="2672557"/>
+            <a:ext cx="1706880" cy="274320"/>
+          </a:xfrm>
+          <a:prstGeom prst="rect">
+            <a:avLst/>
+          </a:prstGeom>
+          <a:solidFill>
+            <a:schemeClr val="bg1">
+              <a:lumMod val="95000"/>
+            </a:schemeClr>
+          </a:solidFill>
+          <a:ln w="6350">
+            <a:solidFill>
+              <a:schemeClr val="bg1">
+                <a:lumMod val="65000"/>
+              </a:schemeClr>
+            </a:solidFill>
+          </a:ln>
+          <a:effectLst>
+            <a:outerShdw blurRad="63500" sx="102000" sy="102000" algn="ctr" rotWithShape="0">
+              <a:prstClr val="black">
+                <a:alpha val="40000"/>
+              </a:prstClr>
+            </a:outerShdw>
+          </a:effectLst>
+        </p:spPr>
+        <p:style>
+          <a:lnRef idx="2">
+            <a:schemeClr val="accent1">
+              <a:shade val="15000"/>
+            </a:schemeClr>
+          </a:lnRef>
+          <a:fillRef idx="1">
+            <a:schemeClr val="accent1"/>
+          </a:fillRef>
+          <a:effectRef idx="0">
+            <a:schemeClr val="accent1"/>
+          </a:effectRef>
+          <a:fontRef idx="minor">
+            <a:schemeClr val="lt1"/>
+          </a:fontRef>
+        </p:style>
+        <p:txBody>
+          <a:bodyPr rtlCol="0" anchor="ctr"/>
+          <a:lstStyle/>
+          <a:p>
+            <a:r>
+              <a:rPr lang="en-US" sz="1100" dirty="0" err="1">
+                <a:solidFill>
+                  <a:schemeClr val="tx1"/>
+                </a:solidFill>
+                <a:latin typeface="Arial" panose="020B0604020202020204" pitchFamily="34" charset="0"/>
+                <a:cs typeface="Arial" panose="020B0604020202020204" pitchFamily="34" charset="0"/>
+              </a:rPr>
+              <a:t>Rafraichir</a:t>
+            </a:r>
+            <a:r>
+              <a:rPr lang="en-US" sz="1100" dirty="0">
+                <a:solidFill>
+                  <a:schemeClr val="tx1"/>
+                </a:solidFill>
+                <a:latin typeface="Arial" panose="020B0604020202020204" pitchFamily="34" charset="0"/>
+                <a:cs typeface="Arial" panose="020B0604020202020204" pitchFamily="34" charset="0"/>
+              </a:rPr>
+              <a:t> la </a:t>
+            </a:r>
+            <a:r>
+              <a:rPr lang="en-US" sz="1100" dirty="0" err="1">
+                <a:solidFill>
+                  <a:schemeClr val="tx1"/>
+                </a:solidFill>
+                <a:latin typeface="Arial" panose="020B0604020202020204" pitchFamily="34" charset="0"/>
+                <a:cs typeface="Arial" panose="020B0604020202020204" pitchFamily="34" charset="0"/>
+              </a:rPr>
+              <a:t>liste</a:t>
+            </a:r>
+            <a:r>
+              <a:rPr lang="en-US" sz="1100" dirty="0">
+                <a:solidFill>
+                  <a:schemeClr val="tx1"/>
+                </a:solidFill>
+                <a:latin typeface="Arial" panose="020B0604020202020204" pitchFamily="34" charset="0"/>
+                <a:cs typeface="Arial" panose="020B0604020202020204" pitchFamily="34" charset="0"/>
+              </a:rPr>
+              <a:t> --&gt;</a:t>
+            </a:r>
+          </a:p>
+        </p:txBody>
+      </p:sp>
+      <p:sp>
+        <p:nvSpPr>
+          <p:cNvPr id="11" name="Rectangle 10">
+            <a:extLst>
+              <a:ext uri="{FF2B5EF4-FFF2-40B4-BE49-F238E27FC236}">
+                <a16:creationId xmlns:a16="http://schemas.microsoft.com/office/drawing/2014/main" id="{429936C8-4956-7FE4-5844-31012B6587B8}"/>
+              </a:ext>
+            </a:extLst>
+          </p:cNvPr>
+          <p:cNvSpPr/>
+          <p:nvPr/>
+        </p:nvSpPr>
+        <p:spPr>
+          <a:xfrm>
+            <a:off x="5875019" y="4108450"/>
+            <a:ext cx="474979" cy="274320"/>
+          </a:xfrm>
+          <a:prstGeom prst="rect">
+            <a:avLst/>
+          </a:prstGeom>
+          <a:solidFill>
+            <a:schemeClr val="bg1">
+              <a:lumMod val="95000"/>
+            </a:schemeClr>
+          </a:solidFill>
+          <a:ln w="6350">
+            <a:solidFill>
+              <a:schemeClr val="bg1">
+                <a:lumMod val="65000"/>
+              </a:schemeClr>
+            </a:solidFill>
+          </a:ln>
+          <a:effectLst>
+            <a:outerShdw blurRad="63500" sx="102000" sy="102000" algn="ctr" rotWithShape="0">
+              <a:prstClr val="black">
+                <a:alpha val="40000"/>
+              </a:prstClr>
+            </a:outerShdw>
+          </a:effectLst>
+        </p:spPr>
+        <p:style>
+          <a:lnRef idx="2">
+            <a:schemeClr val="accent1">
+              <a:shade val="15000"/>
+            </a:schemeClr>
+          </a:lnRef>
+          <a:fillRef idx="1">
+            <a:schemeClr val="accent1"/>
+          </a:fillRef>
+          <a:effectRef idx="0">
+            <a:schemeClr val="accent1"/>
+          </a:effectRef>
+          <a:fontRef idx="minor">
+            <a:schemeClr val="lt1"/>
+          </a:fontRef>
+        </p:style>
+        <p:txBody>
+          <a:bodyPr rtlCol="0" anchor="ctr"/>
+          <a:lstStyle/>
+          <a:p>
+            <a:r>
+              <a:rPr lang="en-US" sz="1100" dirty="0">
+                <a:solidFill>
+                  <a:schemeClr val="tx1"/>
+                </a:solidFill>
+                <a:latin typeface="Arial" panose="020B0604020202020204" pitchFamily="34" charset="0"/>
+                <a:cs typeface="Arial" panose="020B0604020202020204" pitchFamily="34" charset="0"/>
+              </a:rPr>
+              <a:t>Parc.</a:t>
+            </a:r>
+          </a:p>
+        </p:txBody>
+      </p:sp>
+      <p:sp>
+        <p:nvSpPr>
+          <p:cNvPr id="12" name="Rectangle 11">
+            <a:extLst>
+              <a:ext uri="{FF2B5EF4-FFF2-40B4-BE49-F238E27FC236}">
+                <a16:creationId xmlns:a16="http://schemas.microsoft.com/office/drawing/2014/main" id="{B776297F-CF59-F1C3-1CEC-DE6589ABFF4C}"/>
+              </a:ext>
+            </a:extLst>
+          </p:cNvPr>
+          <p:cNvSpPr/>
+          <p:nvPr/>
+        </p:nvSpPr>
+        <p:spPr>
+          <a:xfrm>
+            <a:off x="2581275" y="4108450"/>
+            <a:ext cx="3209925" cy="274320"/>
+          </a:xfrm>
+          <a:prstGeom prst="rect">
+            <a:avLst/>
+          </a:prstGeom>
+          <a:solidFill>
+            <a:schemeClr val="bg1"/>
+          </a:solidFill>
+          <a:ln w="6350">
+            <a:solidFill>
+              <a:schemeClr val="bg1">
+                <a:lumMod val="65000"/>
+              </a:schemeClr>
+            </a:solidFill>
+          </a:ln>
+        </p:spPr>
+        <p:style>
+          <a:lnRef idx="2">
+            <a:schemeClr val="accent1">
+              <a:shade val="15000"/>
+            </a:schemeClr>
+          </a:lnRef>
+          <a:fillRef idx="1">
+            <a:schemeClr val="accent1"/>
+          </a:fillRef>
+          <a:effectRef idx="0">
+            <a:schemeClr val="accent1"/>
+          </a:effectRef>
+          <a:fontRef idx="minor">
+            <a:schemeClr val="lt1"/>
+          </a:fontRef>
+        </p:style>
+        <p:txBody>
+          <a:bodyPr rtlCol="0" anchor="t"/>
+          <a:lstStyle/>
+          <a:p>
+            <a:r>
+              <a:rPr lang="en-US" sz="1100" dirty="0" err="1">
+                <a:solidFill>
+                  <a:schemeClr val="tx1"/>
+                </a:solidFill>
+                <a:latin typeface="Arial" panose="020B0604020202020204" pitchFamily="34" charset="0"/>
+                <a:cs typeface="Arial" panose="020B0604020202020204" pitchFamily="34" charset="0"/>
+              </a:rPr>
+              <a:t>Fichier</a:t>
+            </a:r>
+            <a:r>
+              <a:rPr lang="en-US" sz="1100" dirty="0">
+                <a:solidFill>
+                  <a:schemeClr val="tx1"/>
+                </a:solidFill>
+                <a:latin typeface="Arial" panose="020B0604020202020204" pitchFamily="34" charset="0"/>
+                <a:cs typeface="Arial" panose="020B0604020202020204" pitchFamily="34" charset="0"/>
+              </a:rPr>
+              <a:t> à </a:t>
+            </a:r>
+            <a:r>
+              <a:rPr lang="en-US" sz="1100" dirty="0" err="1">
+                <a:solidFill>
+                  <a:schemeClr val="tx1"/>
+                </a:solidFill>
+                <a:latin typeface="Arial" panose="020B0604020202020204" pitchFamily="34" charset="0"/>
+                <a:cs typeface="Arial" panose="020B0604020202020204" pitchFamily="34" charset="0"/>
+              </a:rPr>
+              <a:t>enregistrer</a:t>
+            </a:r>
+            <a:endParaRPr lang="en-US" sz="1100" dirty="0">
+              <a:solidFill>
+                <a:schemeClr val="tx1"/>
+              </a:solidFill>
+              <a:latin typeface="Arial" panose="020B0604020202020204" pitchFamily="34" charset="0"/>
+              <a:cs typeface="Arial" panose="020B0604020202020204" pitchFamily="34" charset="0"/>
+            </a:endParaRPr>
+          </a:p>
+        </p:txBody>
+      </p:sp>
+      <p:sp>
+        <p:nvSpPr>
+          <p:cNvPr id="14" name="Rectangle 13">
+            <a:extLst>
+              <a:ext uri="{FF2B5EF4-FFF2-40B4-BE49-F238E27FC236}">
+                <a16:creationId xmlns:a16="http://schemas.microsoft.com/office/drawing/2014/main" id="{0E21A50F-706F-7944-D262-252592D72674}"/>
+              </a:ext>
+            </a:extLst>
+          </p:cNvPr>
+          <p:cNvSpPr/>
+          <p:nvPr/>
+        </p:nvSpPr>
+        <p:spPr>
+          <a:xfrm>
+            <a:off x="3634740" y="4494926"/>
+            <a:ext cx="1661794" cy="595234"/>
+          </a:xfrm>
+          <a:prstGeom prst="rect">
+            <a:avLst/>
+          </a:prstGeom>
+          <a:solidFill>
+            <a:schemeClr val="bg1">
+              <a:lumMod val="95000"/>
+            </a:schemeClr>
+          </a:solidFill>
+          <a:ln w="6350">
+            <a:solidFill>
+              <a:schemeClr val="bg1">
+                <a:lumMod val="65000"/>
+              </a:schemeClr>
+            </a:solidFill>
+          </a:ln>
+          <a:effectLst>
+            <a:outerShdw blurRad="63500" sx="102000" sy="102000" algn="ctr" rotWithShape="0">
+              <a:prstClr val="black">
+                <a:alpha val="40000"/>
+              </a:prstClr>
+            </a:outerShdw>
+          </a:effectLst>
+        </p:spPr>
+        <p:style>
+          <a:lnRef idx="2">
+            <a:schemeClr val="accent1">
+              <a:shade val="15000"/>
+            </a:schemeClr>
+          </a:lnRef>
+          <a:fillRef idx="1">
+            <a:schemeClr val="accent1"/>
+          </a:fillRef>
+          <a:effectRef idx="0">
+            <a:schemeClr val="accent1"/>
+          </a:effectRef>
+          <a:fontRef idx="minor">
+            <a:schemeClr val="lt1"/>
+          </a:fontRef>
+        </p:style>
+        <p:txBody>
+          <a:bodyPr rtlCol="0" anchor="ctr"/>
+          <a:lstStyle/>
+          <a:p>
+            <a:pPr algn="ctr"/>
+            <a:r>
+              <a:rPr lang="en-US" sz="1100" dirty="0" err="1">
+                <a:solidFill>
+                  <a:schemeClr val="tx1"/>
+                </a:solidFill>
+                <a:latin typeface="Arial" panose="020B0604020202020204" pitchFamily="34" charset="0"/>
+                <a:cs typeface="Arial" panose="020B0604020202020204" pitchFamily="34" charset="0"/>
+              </a:rPr>
+              <a:t>Fusionner</a:t>
+            </a:r>
+            <a:endParaRPr lang="en-US" sz="1100" dirty="0">
+              <a:solidFill>
+                <a:schemeClr val="tx1"/>
+              </a:solidFill>
+              <a:latin typeface="Arial" panose="020B0604020202020204" pitchFamily="34" charset="0"/>
+              <a:cs typeface="Arial" panose="020B0604020202020204" pitchFamily="34" charset="0"/>
+            </a:endParaRPr>
+          </a:p>
+        </p:txBody>
+      </p:sp>
+    </p:spTree>
+    <p:extLst>
+      <p:ext uri="{BB962C8B-B14F-4D97-AF65-F5344CB8AC3E}">
+        <p14:creationId xmlns:p14="http://schemas.microsoft.com/office/powerpoint/2010/main" val="3312574243"/>
+      </p:ext>
+    </p:extLst>
+  </p:cSld>
+  <p:clrMapOvr>
+    <a:masterClrMapping/>
+  </p:clrMapOvr>
+</p:sld>
+</file>
+
 <file path=ppt/theme/theme1.xml><?xml version="1.0" encoding="utf-8"?>
 <a:theme xmlns:a="http://schemas.openxmlformats.org/drawingml/2006/main" name="Thème Office">
   <a:themeElements>

</xml_diff>